<commit_message>
two final projects done :)
</commit_message>
<xml_diff>
--- a/cs116/project/CS116 final project.pptx
+++ b/cs116/project/CS116 final project.pptx
@@ -2664,10 +2664,10 @@
           <a:bodyPr/>
           <a:p>
             <a:r>
-              <a:rPr lang="" altLang="en-US"/>
+              <a:rPr lang="en-US" altLang="en-US"/>
               <a:t>CS116 final project</a:t>
             </a:r>
-            <a:endParaRPr lang="" altLang="en-US"/>
+            <a:endParaRPr lang="en-US" altLang="en-US"/>
           </a:p>
         </p:txBody>
       </p:sp>
@@ -2686,10 +2686,10 @@
           <a:bodyPr/>
           <a:p>
             <a:r>
-              <a:rPr lang="" altLang="en-US"/>
+              <a:rPr lang="en-US" altLang="en-US"/>
               <a:t>Dustin Van Tate Testa</a:t>
             </a:r>
-            <a:endParaRPr lang="" altLang="en-US"/>
+            <a:endParaRPr lang="en-US" altLang="en-US"/>
           </a:p>
         </p:txBody>
       </p:sp>
@@ -2726,10 +2726,10 @@
           <a:bodyPr/>
           <a:p>
             <a:r>
-              <a:rPr lang="" altLang="en-US"/>
+              <a:rPr lang="en-US" altLang="en-US"/>
               <a:t>TrafficLight class</a:t>
             </a:r>
-            <a:endParaRPr lang="" altLang="en-US"/>
+            <a:endParaRPr lang="en-US" altLang="en-US"/>
           </a:p>
         </p:txBody>
       </p:sp>
@@ -2748,35 +2748,35 @@
           <a:bodyPr/>
           <a:p>
             <a:r>
-              <a:rPr lang="" altLang="en-US" sz="1800"/>
+              <a:rPr lang="en-US" altLang="en-US" sz="1800"/>
               <a:t>enum typedef for the state of the light</a:t>
             </a:r>
-            <a:endParaRPr lang="" altLang="en-US" sz="1800"/>
-          </a:p>
-          <a:p>
-            <a:r>
-              <a:rPr lang="" altLang="en-US" sz="1800"/>
+            <a:endParaRPr lang="en-US" altLang="en-US" sz="1800"/>
+          </a:p>
+          <a:p>
+            <a:r>
+              <a:rPr lang="en-US" altLang="en-US" sz="1800"/>
               <a:t>attributes for current tick, number of ticks for green and orange.</a:t>
             </a:r>
-            <a:endParaRPr lang="" altLang="en-US" sz="1800"/>
-          </a:p>
-          <a:p>
-            <a:r>
-              <a:rPr lang="" altLang="en-US" sz="1800"/>
+            <a:endParaRPr lang="en-US" altLang="en-US" sz="1800"/>
+          </a:p>
+          <a:p>
+            <a:r>
+              <a:rPr lang="en-US" altLang="en-US" sz="1800"/>
               <a:t>unimportant note: as a C++ programmer, without even thinking i did the appropriate steps to make this class work with unsigned 8 bit integers instead of java's ints so it should be even more failsafe.</a:t>
             </a:r>
-            <a:endParaRPr lang="" altLang="en-US" sz="1800"/>
+            <a:endParaRPr lang="en-US" altLang="en-US" sz="1800"/>
           </a:p>
           <a:p>
             <a:pPr lvl="1"/>
             <a:r>
-              <a:rPr lang="" altLang="en-US" sz="1540"/>
+              <a:rPr lang="en-US" altLang="en-US" sz="1540"/>
               <a:t>entire system uses clocklike adding</a:t>
             </a:r>
-            <a:endParaRPr lang="" altLang="en-US" sz="1540"/>
-          </a:p>
-          <a:p>
-            <a:endParaRPr lang="" altLang="en-US" sz="1800"/>
+            <a:endParaRPr lang="en-US" altLang="en-US" sz="1540"/>
+          </a:p>
+          <a:p>
+            <a:endParaRPr lang="en-US" altLang="en-US" sz="1800"/>
           </a:p>
         </p:txBody>
       </p:sp>
@@ -2868,10 +2868,10 @@
           </a:bodyPr>
           <a:p>
             <a:r>
-              <a:rPr lang="" altLang="en-US"/>
+              <a:rPr lang="en-US" altLang="en-US"/>
               <a:t>keypoints of the TrafficBlock subclass</a:t>
             </a:r>
-            <a:endParaRPr lang="" altLang="en-US"/>
+            <a:endParaRPr lang="en-US" altLang="en-US"/>
           </a:p>
         </p:txBody>
       </p:sp>
@@ -2890,17 +2890,17 @@
           <a:bodyPr/>
           <a:p>
             <a:r>
-              <a:rPr lang="" altLang="en-US"/>
+              <a:rPr lang="en-US" altLang="en-US"/>
               <a:t>has a trafficlight member</a:t>
             </a:r>
-            <a:endParaRPr lang="" altLang="en-US"/>
-          </a:p>
-          <a:p>
-            <a:r>
-              <a:rPr lang="" altLang="en-US"/>
+            <a:endParaRPr lang="en-US" altLang="en-US"/>
+          </a:p>
+          <a:p>
+            <a:r>
+              <a:rPr lang="en-US" altLang="en-US"/>
               <a:t>tick() method updates traffic light, and if its green moves auto along, otherwise, writes to the log that the auto is waiting at the stoplight.</a:t>
             </a:r>
-            <a:endParaRPr lang="" altLang="en-US"/>
+            <a:endParaRPr lang="en-US" altLang="en-US"/>
           </a:p>
         </p:txBody>
       </p:sp>
@@ -2961,10 +2961,10 @@
           <a:bodyPr/>
           <a:p>
             <a:r>
-              <a:rPr lang="" altLang="en-US"/>
+              <a:rPr lang="en-US" altLang="en-US"/>
               <a:t>keypoints of the Auto class</a:t>
             </a:r>
-            <a:endParaRPr lang="" altLang="en-US"/>
+            <a:endParaRPr lang="en-US" altLang="en-US"/>
           </a:p>
         </p:txBody>
       </p:sp>
@@ -2988,46 +2988,46 @@
           <a:bodyPr/>
           <a:p>
             <a:r>
-              <a:rPr lang="" altLang="en-US" sz="1600"/>
+              <a:rPr lang="en-US" altLang="en-US" sz="1600"/>
               <a:t>only funcitonality contribution is to count the number of ticks needed to complete its path as its movement is handled by the road.</a:t>
             </a:r>
-            <a:endParaRPr lang="" altLang="en-US" sz="1600"/>
-          </a:p>
-          <a:p>
-            <a:r>
-              <a:rPr lang="" altLang="en-US" sz="1600"/>
+            <a:endParaRPr lang="en-US" altLang="en-US" sz="1600"/>
+          </a:p>
+          <a:p>
+            <a:r>
+              <a:rPr lang="en-US" altLang="en-US" sz="1600"/>
               <a:t>each tick it adjusts its internal clock</a:t>
             </a:r>
-            <a:endParaRPr lang="" altLang="en-US" sz="1600"/>
-          </a:p>
-          <a:p>
-            <a:r>
-              <a:rPr lang="" altLang="en-US" sz="1600"/>
+            <a:endParaRPr lang="en-US" altLang="en-US" sz="1600"/>
+          </a:p>
+          <a:p>
+            <a:r>
+              <a:rPr lang="en-US" altLang="en-US" sz="1600"/>
               <a:t>if the car is moved it calls the setMoved(current tick) method so that it only moves once per tick</a:t>
             </a:r>
-            <a:endParaRPr lang="" altLang="en-US" sz="1600"/>
+            <a:endParaRPr lang="en-US" altLang="en-US" sz="1600"/>
           </a:p>
           <a:p>
             <a:pPr lvl="1"/>
             <a:r>
-              <a:rPr lang="" altLang="en-US" sz="1000"/>
+              <a:rPr lang="en-US" altLang="en-US" sz="1000"/>
               <a:t>kinda a bodge after i noticed that cars did their entire path in only 5 ticks or so (awk)</a:t>
             </a:r>
-            <a:endParaRPr lang="" altLang="en-US" sz="1370"/>
-          </a:p>
-          <a:p>
-            <a:r>
-              <a:rPr lang="" altLang="en-US" sz="1600"/>
+            <a:endParaRPr lang="en-US" altLang="en-US" sz="1370"/>
+          </a:p>
+          <a:p>
+            <a:r>
+              <a:rPr lang="en-US" altLang="en-US" sz="1600"/>
               <a:t>the orientation of the car is loosely tracked and set when it goes through different blocks so that the intersection blocks know from what direction it came from</a:t>
             </a:r>
-            <a:endParaRPr lang="" altLang="en-US" sz="1600"/>
-          </a:p>
-          <a:p>
-            <a:r>
-              <a:rPr lang="" altLang="en-US" sz="1600"/>
+            <a:endParaRPr lang="en-US" altLang="en-US" sz="1600"/>
+          </a:p>
+          <a:p>
+            <a:r>
+              <a:rPr lang="en-US" altLang="en-US" sz="1600"/>
               <a:t>cars have unique ids too</a:t>
             </a:r>
-            <a:endParaRPr lang="" altLang="en-US" sz="1600"/>
+            <a:endParaRPr lang="en-US" altLang="en-US" sz="1600"/>
           </a:p>
         </p:txBody>
       </p:sp>
@@ -3093,10 +3093,10 @@
           <a:bodyPr/>
           <a:p>
             <a:r>
-              <a:rPr lang="" altLang="en-US"/>
+              <a:rPr lang="en-US" altLang="en-US"/>
               <a:t>Keypoints of the RoadNetwork class</a:t>
             </a:r>
-            <a:endParaRPr lang="" altLang="en-US"/>
+            <a:endParaRPr lang="en-US" altLang="en-US"/>
           </a:p>
         </p:txBody>
       </p:sp>
@@ -3120,52 +3120,52 @@
           <a:bodyPr/>
           <a:p>
             <a:r>
-              <a:rPr lang="" altLang="en-US" sz="2400"/>
+              <a:rPr lang="en-US" altLang="en-US" sz="2400"/>
               <a:t>This service class is where the majority of the actual functionality of the project stems from.</a:t>
             </a:r>
-            <a:endParaRPr lang="" altLang="en-US" sz="2400"/>
-          </a:p>
-          <a:p>
-            <a:r>
-              <a:rPr lang="" altLang="en-US" sz="2400"/>
+            <a:endParaRPr lang="en-US" altLang="en-US" sz="2400"/>
+          </a:p>
+          <a:p>
+            <a:r>
+              <a:rPr lang="en-US" altLang="en-US" sz="2400"/>
               <a:t>Attributes:</a:t>
             </a:r>
-            <a:endParaRPr lang="" altLang="en-US" sz="2400"/>
+            <a:endParaRPr lang="en-US" altLang="en-US" sz="2400"/>
           </a:p>
           <a:p>
             <a:pPr lvl="1"/>
             <a:r>
-              <a:rPr lang="" altLang="en-US" sz="2055"/>
+              <a:rPr lang="en-US" altLang="en-US" sz="2055"/>
               <a:t>autos, blocks: list of all autos and blocks in current simulation</a:t>
             </a:r>
-            <a:endParaRPr lang="" altLang="en-US" sz="2055"/>
+            <a:endParaRPr lang="en-US" altLang="en-US" sz="2055"/>
           </a:p>
           <a:p>
             <a:pPr lvl="1"/>
             <a:r>
-              <a:rPr lang="" altLang="en-US" sz="2055"/>
+              <a:rPr lang="en-US" altLang="en-US" sz="2055"/>
               <a:t>waitTimes: commute times for cars exiting simulation (organized by exit)</a:t>
             </a:r>
-            <a:endParaRPr lang="" altLang="en-US" sz="2055"/>
+            <a:endParaRPr lang="en-US" altLang="en-US" sz="2055"/>
           </a:p>
           <a:p>
             <a:pPr lvl="1"/>
             <a:r>
-              <a:rPr lang="" altLang="en-US" sz="2055"/>
+              <a:rPr lang="en-US" altLang="en-US" sz="2055"/>
               <a:t>ticks: current tick number</a:t>
             </a:r>
-            <a:endParaRPr lang="" altLang="en-US" sz="2055"/>
+            <a:endParaRPr lang="en-US" altLang="en-US" sz="2055"/>
           </a:p>
           <a:p>
             <a:pPr lvl="1"/>
             <a:r>
-              <a:rPr lang="" altLang="en-US" sz="2055"/>
+              <a:rPr lang="en-US" altLang="en-US" sz="2055"/>
               <a:t>spawnPoints[], despawnPoints[], id's of blocks where Autos are added/removed from the system</a:t>
             </a:r>
-            <a:endParaRPr lang="" altLang="en-US" sz="2055"/>
-          </a:p>
-          <a:p>
-            <a:endParaRPr lang="" altLang="en-US" sz="2400"/>
+            <a:endParaRPr lang="en-US" altLang="en-US" sz="2055"/>
+          </a:p>
+          <a:p>
+            <a:endParaRPr lang="en-US" altLang="en-US" sz="2400"/>
           </a:p>
         </p:txBody>
       </p:sp>
@@ -3231,10 +3231,10 @@
           <a:bodyPr/>
           <a:p>
             <a:r>
-              <a:rPr lang="" altLang="en-US"/>
+              <a:rPr lang="en-US" altLang="en-US"/>
               <a:t>RoadNetwork methods</a:t>
             </a:r>
-            <a:endParaRPr lang="" altLang="en-US"/>
+            <a:endParaRPr lang="en-US" altLang="en-US"/>
           </a:p>
         </p:txBody>
       </p:sp>
@@ -3290,10 +3290,10 @@
               <a:buChar char="•"/>
             </a:pPr>
             <a:r>
-              <a:rPr lang="" altLang="en-US"/>
+              <a:rPr lang="en-US" altLang="en-US"/>
               <a:t>constructor: sets user-provided constants and instantiates ArrayLists</a:t>
             </a:r>
-            <a:endParaRPr lang="" altLang="en-US"/>
+            <a:endParaRPr lang="en-US" altLang="en-US"/>
           </a:p>
           <a:p>
             <a:pPr marL="285750" indent="-285750">
@@ -3301,10 +3301,10 @@
               <a:buChar char="•"/>
             </a:pPr>
             <a:r>
-              <a:rPr lang="" altLang="en-US"/>
+              <a:rPr lang="en-US" altLang="en-US"/>
               <a:t>getAutoById(), getBlockById(): returns reference to Block/Auto corresponding to given id</a:t>
             </a:r>
-            <a:endParaRPr lang="" altLang="en-US"/>
+            <a:endParaRPr lang="en-US" altLang="en-US"/>
           </a:p>
           <a:p>
             <a:pPr marL="285750" indent="-285750">
@@ -3312,10 +3312,10 @@
               <a:buChar char="•"/>
             </a:pPr>
             <a:r>
-              <a:rPr lang="" altLang="en-US"/>
+              <a:rPr lang="en-US" altLang="en-US"/>
               <a:t>spawnAuto(): adds an auto to simulation at given spawn point</a:t>
             </a:r>
-            <a:endParaRPr lang="" altLang="en-US"/>
+            <a:endParaRPr lang="en-US" altLang="en-US"/>
           </a:p>
           <a:p>
             <a:pPr marL="285750" indent="-285750">
@@ -3323,10 +3323,10 @@
               <a:buChar char="•"/>
             </a:pPr>
             <a:r>
-              <a:rPr lang="" altLang="en-US"/>
+              <a:rPr lang="en-US" altLang="en-US"/>
               <a:t>deleteAuto(): </a:t>
             </a:r>
-            <a:endParaRPr lang="" altLang="en-US"/>
+            <a:endParaRPr lang="en-US" altLang="en-US"/>
           </a:p>
           <a:p>
             <a:pPr marL="742950" lvl="1" indent="-285750">
@@ -3334,10 +3334,10 @@
               <a:buChar char="•"/>
             </a:pPr>
             <a:r>
-              <a:rPr lang="" altLang="en-US"/>
+              <a:rPr lang="en-US" altLang="en-US"/>
               <a:t>removes auto from simulation</a:t>
             </a:r>
-            <a:endParaRPr lang="" altLang="en-US"/>
+            <a:endParaRPr lang="en-US" altLang="en-US"/>
           </a:p>
           <a:p>
             <a:pPr marL="742950" lvl="1" indent="-285750">
@@ -3345,10 +3345,10 @@
               <a:buChar char="•"/>
             </a:pPr>
             <a:r>
-              <a:rPr lang="" altLang="en-US"/>
+              <a:rPr lang="en-US" altLang="en-US"/>
               <a:t>adds it's commute time to waitTimes</a:t>
             </a:r>
-            <a:endParaRPr lang="" altLang="en-US"/>
+            <a:endParaRPr lang="en-US" altLang="en-US"/>
           </a:p>
           <a:p>
             <a:pPr marL="285750" lvl="0" indent="-285750">
@@ -3356,10 +3356,10 @@
               <a:buChar char="•"/>
             </a:pPr>
             <a:r>
-              <a:rPr lang="" altLang="en-US"/>
+              <a:rPr lang="en-US" altLang="en-US"/>
               <a:t>access modifiers: because i wanted to use protected members</a:t>
             </a:r>
-            <a:endParaRPr lang="" altLang="en-US"/>
+            <a:endParaRPr lang="en-US" altLang="en-US"/>
           </a:p>
           <a:p>
             <a:pPr marL="285750" lvl="0" indent="-285750">
@@ -3367,10 +3367,10 @@
               <a:buChar char="•"/>
             </a:pPr>
             <a:r>
-              <a:rPr lang="" altLang="en-US"/>
+              <a:rPr lang="en-US" altLang="en-US"/>
               <a:t>populate(): 150+ line function i wrote over the course of 3 different time periods yet surprisingly worked essentially perfectly without having to change anything</a:t>
             </a:r>
-            <a:endParaRPr lang="" altLang="en-US"/>
+            <a:endParaRPr lang="en-US" altLang="en-US"/>
           </a:p>
           <a:p>
             <a:pPr marL="742950" lvl="1" indent="-285750">
@@ -3378,10 +3378,10 @@
               <a:buChar char="•"/>
             </a:pPr>
             <a:r>
-              <a:rPr lang="" altLang="en-US"/>
+              <a:rPr lang="en-US" altLang="en-US"/>
               <a:t>instantiates every block element, links them together correctly, fills in the correct id's to the other attributes, and puts the blocks in the blocks attribute</a:t>
             </a:r>
-            <a:endParaRPr lang="" altLang="en-US"/>
+            <a:endParaRPr lang="en-US" altLang="en-US"/>
           </a:p>
           <a:p>
             <a:pPr marL="285750" lvl="0" indent="-285750">
@@ -3389,10 +3389,10 @@
               <a:buChar char="•"/>
             </a:pPr>
             <a:r>
-              <a:rPr lang="" altLang="en-US"/>
+              <a:rPr lang="en-US" altLang="en-US"/>
               <a:t>tick(): </a:t>
             </a:r>
-            <a:endParaRPr lang="" altLang="en-US"/>
+            <a:endParaRPr lang="en-US" altLang="en-US"/>
           </a:p>
           <a:p>
             <a:pPr marL="742950" lvl="1" indent="-285750">
@@ -3400,10 +3400,10 @@
               <a:buChar char="•"/>
             </a:pPr>
             <a:r>
-              <a:rPr lang="" altLang="en-US"/>
+              <a:rPr lang="en-US" altLang="en-US"/>
               <a:t>updates Autos</a:t>
             </a:r>
-            <a:endParaRPr lang="" altLang="en-US"/>
+            <a:endParaRPr lang="en-US" altLang="en-US"/>
           </a:p>
           <a:p>
             <a:pPr marL="742950" lvl="1" indent="-285750">
@@ -3411,10 +3411,10 @@
               <a:buChar char="•"/>
             </a:pPr>
             <a:r>
-              <a:rPr lang="" altLang="en-US"/>
+              <a:rPr lang="en-US" altLang="en-US"/>
               <a:t>updates Blocks (which move Autos)</a:t>
             </a:r>
-            <a:endParaRPr lang="" altLang="en-US"/>
+            <a:endParaRPr lang="en-US" altLang="en-US"/>
           </a:p>
           <a:p>
             <a:pPr marL="742950" lvl="1" indent="-285750">
@@ -3422,10 +3422,10 @@
               <a:buChar char="•"/>
             </a:pPr>
             <a:r>
-              <a:rPr lang="" altLang="en-US"/>
+              <a:rPr lang="en-US" altLang="en-US"/>
               <a:t>spawns cars according to the entry rate</a:t>
             </a:r>
-            <a:endParaRPr lang="" altLang="en-US"/>
+            <a:endParaRPr lang="en-US" altLang="en-US"/>
           </a:p>
           <a:p>
             <a:pPr marL="285750" lvl="0" indent="-285750">
@@ -3433,10 +3433,10 @@
               <a:buChar char="•"/>
             </a:pPr>
             <a:r>
-              <a:rPr lang="" altLang="en-US"/>
+              <a:rPr lang="en-US" altLang="en-US"/>
               <a:t>averageWaitTime(): average wait time for autos which passed through simulation</a:t>
             </a:r>
-            <a:endParaRPr lang="" altLang="en-US"/>
+            <a:endParaRPr lang="en-US" altLang="en-US"/>
           </a:p>
           <a:p>
             <a:pPr marL="285750" lvl="0" indent="-285750">
@@ -3444,52 +3444,52 @@
               <a:buChar char="•"/>
             </a:pPr>
             <a:r>
-              <a:rPr lang="" altLang="en-US"/>
+              <a:rPr lang="en-US" altLang="en-US"/>
               <a:t>exitRates(): number of vehicles exiting each exit per tick</a:t>
             </a:r>
-            <a:endParaRPr lang="" altLang="en-US"/>
+            <a:endParaRPr lang="en-US" altLang="en-US"/>
           </a:p>
           <a:p>
             <a:pPr marL="285750" lvl="0" indent="-285750">
               <a:buFont typeface="Arial" panose="02080604020202020204" pitchFamily="34" charset="0"/>
               <a:buChar char="•"/>
             </a:pPr>
-            <a:endParaRPr lang="" altLang="en-US"/>
+            <a:endParaRPr lang="en-US" altLang="en-US"/>
           </a:p>
           <a:p>
             <a:pPr marL="742950" lvl="1" indent="-285750">
               <a:buFont typeface="Arial" panose="02080604020202020204" pitchFamily="34" charset="0"/>
               <a:buChar char="•"/>
             </a:pPr>
-            <a:endParaRPr lang="" altLang="en-US"/>
+            <a:endParaRPr lang="en-US" altLang="en-US"/>
           </a:p>
           <a:p>
             <a:pPr marL="742950" lvl="1" indent="-285750">
               <a:buFont typeface="Arial" panose="02080604020202020204" pitchFamily="34" charset="0"/>
               <a:buChar char="•"/>
             </a:pPr>
-            <a:endParaRPr lang="" altLang="en-US"/>
+            <a:endParaRPr lang="en-US" altLang="en-US"/>
           </a:p>
           <a:p>
             <a:pPr marL="285750" lvl="0" indent="-285750">
               <a:buFont typeface="Arial" panose="02080604020202020204" pitchFamily="34" charset="0"/>
               <a:buChar char="•"/>
             </a:pPr>
-            <a:endParaRPr lang="" altLang="en-US"/>
+            <a:endParaRPr lang="en-US" altLang="en-US"/>
           </a:p>
           <a:p>
             <a:pPr marL="285750" indent="-285750">
               <a:buFont typeface="Arial" panose="02080604020202020204" pitchFamily="34" charset="0"/>
               <a:buChar char="•"/>
             </a:pPr>
-            <a:endParaRPr lang="" altLang="en-US"/>
+            <a:endParaRPr lang="en-US" altLang="en-US"/>
           </a:p>
           <a:p>
             <a:pPr marL="285750" indent="-285750">
               <a:buFont typeface="Arial" panose="02080604020202020204" pitchFamily="34" charset="0"/>
               <a:buChar char="•"/>
             </a:pPr>
-            <a:endParaRPr lang="" altLang="en-US"/>
+            <a:endParaRPr lang="en-US" altLang="en-US"/>
           </a:p>
         </p:txBody>
       </p:sp>
@@ -3550,10 +3550,10 @@
           <a:bodyPr/>
           <a:p>
             <a:r>
-              <a:rPr lang="" altLang="en-US"/>
+              <a:rPr lang="en-US" altLang="en-US"/>
               <a:t>Client uml overview</a:t>
             </a:r>
-            <a:endParaRPr lang="" altLang="en-US"/>
+            <a:endParaRPr lang="en-US" altLang="en-US"/>
           </a:p>
         </p:txBody>
       </p:sp>
@@ -3616,10 +3616,10 @@
           <a:bodyPr/>
           <a:p>
             <a:r>
-              <a:rPr lang="" altLang="en-US"/>
+              <a:rPr lang="en-US" altLang="en-US"/>
               <a:t>Log class</a:t>
             </a:r>
-            <a:endParaRPr lang="" altLang="en-US"/>
+            <a:endParaRPr lang="en-US" altLang="en-US"/>
           </a:p>
         </p:txBody>
       </p:sp>
@@ -3643,34 +3643,34 @@
           <a:bodyPr/>
           <a:p>
             <a:r>
-              <a:rPr lang="" altLang="en-US"/>
+              <a:rPr lang="en-US" altLang="en-US"/>
               <a:t>this handles the compilation of messages into the output file</a:t>
             </a:r>
-            <a:endParaRPr lang="" altLang="en-US"/>
-          </a:p>
-          <a:p>
-            <a:r>
-              <a:rPr lang="" altLang="en-US"/>
+            <a:endParaRPr lang="en-US" altLang="en-US"/>
+          </a:p>
+          <a:p>
+            <a:r>
+              <a:rPr lang="en-US" altLang="en-US"/>
               <a:t>constructed with a filename,</a:t>
             </a:r>
-            <a:endParaRPr lang="" altLang="en-US"/>
-          </a:p>
-          <a:p>
-            <a:r>
-              <a:rPr lang="" altLang="en-US"/>
+            <a:endParaRPr lang="en-US" altLang="en-US"/>
+          </a:p>
+          <a:p>
+            <a:r>
+              <a:rPr lang="en-US" altLang="en-US"/>
               <a:t>use .put() to add log entries</a:t>
             </a:r>
-            <a:endParaRPr lang="" altLang="en-US"/>
-          </a:p>
-          <a:p>
-            <a:r>
-              <a:rPr lang="" altLang="en-US"/>
+            <a:endParaRPr lang="en-US" altLang="en-US"/>
+          </a:p>
+          <a:p>
+            <a:r>
+              <a:rPr lang="en-US" altLang="en-US"/>
               <a:t>use .write to output to the file</a:t>
             </a:r>
-            <a:endParaRPr lang="" altLang="en-US"/>
-          </a:p>
-          <a:p>
-            <a:endParaRPr lang="" altLang="en-US"/>
+            <a:endParaRPr lang="en-US" altLang="en-US"/>
+          </a:p>
+          <a:p>
+            <a:endParaRPr lang="en-US" altLang="en-US"/>
           </a:p>
         </p:txBody>
       </p:sp>
@@ -3755,10 +3755,10 @@
           <a:bodyPr/>
           <a:p>
             <a:r>
-              <a:rPr lang="" altLang="en-US"/>
+              <a:rPr lang="en-US" altLang="en-US"/>
               <a:t>SimulatorConstraints</a:t>
             </a:r>
-            <a:endParaRPr lang="" altLang="en-US"/>
+            <a:endParaRPr lang="en-US" altLang="en-US"/>
           </a:p>
         </p:txBody>
       </p:sp>
@@ -3777,10 +3777,10 @@
           <a:bodyPr/>
           <a:p>
             <a:r>
-              <a:rPr lang="" altLang="en-US"/>
+              <a:rPr lang="en-US" altLang="en-US"/>
               <a:t>i made this type to simply combine all the information the user has to enter into one thing i can pass to the RoadNetwork class. I would normally use a struct to do this in C++ or an anonymous object in javascript so i didn't feel bad about making everything public.</a:t>
             </a:r>
-            <a:endParaRPr lang="" altLang="en-US"/>
+            <a:endParaRPr lang="en-US" altLang="en-US"/>
           </a:p>
         </p:txBody>
       </p:sp>
@@ -3865,10 +3865,10 @@
           <a:bodyPr/>
           <a:p>
             <a:r>
-              <a:rPr lang="" altLang="en-US"/>
+              <a:rPr lang="en-US" altLang="en-US"/>
               <a:t>Simulator</a:t>
             </a:r>
-            <a:endParaRPr lang="" altLang="en-US"/>
+            <a:endParaRPr lang="en-US" altLang="en-US"/>
           </a:p>
         </p:txBody>
       </p:sp>
@@ -3894,45 +3894,45 @@
           </a:bodyPr>
           <a:p>
             <a:r>
-              <a:rPr lang="" altLang="en-US"/>
+              <a:rPr lang="en-US" altLang="en-US"/>
               <a:t>This is just a client so everything is in the main method</a:t>
             </a:r>
-            <a:endParaRPr lang="" altLang="en-US"/>
-          </a:p>
-          <a:p>
-            <a:r>
-              <a:rPr lang="" altLang="en-US"/>
+            <a:endParaRPr lang="en-US" altLang="en-US"/>
+          </a:p>
+          <a:p>
+            <a:r>
+              <a:rPr lang="en-US" altLang="en-US"/>
               <a:t>Instantiates SimulatorConstraints object and prompts user to fill in its values. </a:t>
             </a:r>
-            <a:endParaRPr lang="" altLang="en-US"/>
-          </a:p>
-          <a:p>
-            <a:r>
-              <a:rPr lang="" altLang="en-US"/>
+            <a:endParaRPr lang="en-US" altLang="en-US"/>
+          </a:p>
+          <a:p>
+            <a:r>
+              <a:rPr lang="en-US" altLang="en-US"/>
               <a:t>Makes a Log object</a:t>
             </a:r>
-            <a:endParaRPr lang="" altLang="en-US"/>
-          </a:p>
-          <a:p>
-            <a:r>
-              <a:rPr lang="" altLang="en-US"/>
+            <a:endParaRPr lang="en-US" altLang="en-US"/>
+          </a:p>
+          <a:p>
+            <a:r>
+              <a:rPr lang="en-US" altLang="en-US"/>
               <a:t>makes and populates road network</a:t>
             </a:r>
-            <a:endParaRPr lang="" altLang="en-US"/>
-          </a:p>
-          <a:p>
-            <a:r>
-              <a:rPr lang="" altLang="en-US"/>
+            <a:endParaRPr lang="en-US" altLang="en-US"/>
+          </a:p>
+          <a:p>
+            <a:r>
+              <a:rPr lang="en-US" altLang="en-US"/>
               <a:t>runs simulation by calling .tick() number of times specified</a:t>
             </a:r>
-            <a:endParaRPr lang="" altLang="en-US"/>
-          </a:p>
-          <a:p>
-            <a:r>
-              <a:rPr lang="" altLang="en-US"/>
+            <a:endParaRPr lang="en-US" altLang="en-US"/>
+          </a:p>
+          <a:p>
+            <a:r>
+              <a:rPr lang="en-US" altLang="en-US"/>
               <a:t>formats and prints output of .averageWaitTime() and .exitRates()</a:t>
             </a:r>
-            <a:endParaRPr lang="" altLang="en-US"/>
+            <a:endParaRPr lang="en-US" altLang="en-US"/>
           </a:p>
         </p:txBody>
       </p:sp>
@@ -3993,10 +3993,10 @@
           <a:bodyPr/>
           <a:p>
             <a:r>
-              <a:rPr lang="" altLang="en-US"/>
+              <a:rPr lang="en-US" altLang="en-US"/>
               <a:t>Test cases</a:t>
             </a:r>
-            <a:endParaRPr lang="" altLang="en-US"/>
+            <a:endParaRPr lang="en-US" altLang="en-US"/>
           </a:p>
         </p:txBody>
       </p:sp>
@@ -4015,23 +4015,23 @@
           <a:bodyPr/>
           <a:p>
             <a:r>
-              <a:rPr lang="" altLang="en-US"/>
+              <a:rPr lang="en-US" altLang="en-US"/>
               <a:t>the following slides are the methods that I verified that everything works.</a:t>
             </a:r>
-            <a:endParaRPr lang="" altLang="en-US"/>
-          </a:p>
-          <a:p>
-            <a:r>
-              <a:rPr lang="" altLang="en-US"/>
+            <a:endParaRPr lang="en-US" altLang="en-US"/>
+          </a:p>
+          <a:p>
+            <a:r>
+              <a:rPr lang="en-US" altLang="en-US"/>
               <a:t>There may be a few others which i have neglected to include or more which were more trial with error and analysis</a:t>
             </a:r>
-            <a:endParaRPr lang="" altLang="en-US"/>
-          </a:p>
-          <a:p>
-            <a:endParaRPr lang="" altLang="en-US"/>
-          </a:p>
-          <a:p>
-            <a:endParaRPr lang="" altLang="en-US"/>
+            <a:endParaRPr lang="en-US" altLang="en-US"/>
+          </a:p>
+          <a:p>
+            <a:endParaRPr lang="en-US" altLang="en-US"/>
+          </a:p>
+          <a:p>
+            <a:endParaRPr lang="en-US" altLang="en-US"/>
           </a:p>
         </p:txBody>
       </p:sp>
@@ -4068,10 +4068,10 @@
           <a:bodyPr/>
           <a:p>
             <a:r>
-              <a:rPr lang="" altLang="en-US"/>
+              <a:rPr lang="en-US" altLang="en-US"/>
               <a:t>Solution Overview</a:t>
             </a:r>
-            <a:endParaRPr lang="" altLang="en-US"/>
+            <a:endParaRPr lang="en-US" altLang="en-US"/>
           </a:p>
         </p:txBody>
       </p:sp>
@@ -4090,77 +4090,77 @@
           <a:bodyPr/>
           <a:p>
             <a:r>
-              <a:rPr lang="" altLang="en-US" sz="2400"/>
+              <a:rPr lang="en-US" altLang="en-US" sz="2400"/>
               <a:t>Everything which exists in the simulation as it's own entity is assigned a unique </a:t>
             </a:r>
             <a:r>
-              <a:rPr lang="" altLang="en-US" sz="2400">
+              <a:rPr lang="en-US" altLang="en-US" sz="2400">
                 <a:latin typeface="Hack" panose="020B0609030202020204" charset="0"/>
                 <a:cs typeface="Hack" panose="020B0609030202020204" charset="0"/>
               </a:rPr>
               <a:t>id</a:t>
             </a:r>
             <a:r>
-              <a:rPr lang="" altLang="en-US" sz="2400"/>
+              <a:rPr lang="en-US" altLang="en-US" sz="2400"/>
               <a:t> property</a:t>
             </a:r>
-            <a:endParaRPr lang="" altLang="en-US" sz="2400"/>
-          </a:p>
-          <a:p>
-            <a:r>
-              <a:rPr lang="" altLang="en-US" sz="2400"/>
+            <a:endParaRPr lang="en-US" altLang="en-US" sz="2400"/>
+          </a:p>
+          <a:p>
+            <a:r>
+              <a:rPr lang="en-US" altLang="en-US" sz="2400"/>
               <a:t>The actual objects are stored in the RoadNetwork Class in arrays, and are only referenced to by their id's</a:t>
             </a:r>
-            <a:endParaRPr lang="" altLang="en-US" sz="2400"/>
-          </a:p>
-          <a:p>
-            <a:r>
-              <a:rPr lang="" altLang="en-US" sz="2400"/>
+            <a:endParaRPr lang="en-US" altLang="en-US" sz="2400"/>
+          </a:p>
+          <a:p>
+            <a:r>
+              <a:rPr lang="en-US" altLang="en-US" sz="2400"/>
               <a:t>Everything which operates during the simulation has a </a:t>
             </a:r>
             <a:r>
-              <a:rPr lang="" altLang="en-US" sz="2400">
+              <a:rPr lang="en-US" altLang="en-US" sz="2400">
                 <a:latin typeface="Hack" panose="020B0609030202020204" charset="0"/>
                 <a:cs typeface="Hack" panose="020B0609030202020204" charset="0"/>
               </a:rPr>
               <a:t>tick()</a:t>
             </a:r>
             <a:r>
-              <a:rPr lang="" altLang="en-US" sz="2400"/>
+              <a:rPr lang="en-US" altLang="en-US" sz="2400"/>
               <a:t> method which gets called once per tick</a:t>
             </a:r>
-            <a:endParaRPr lang="" altLang="en-US" sz="2400"/>
-          </a:p>
-          <a:p>
-            <a:r>
-              <a:rPr lang="" altLang="en-US" sz="2400"/>
+            <a:endParaRPr lang="en-US" altLang="en-US" sz="2400"/>
+          </a:p>
+          <a:p>
+            <a:r>
+              <a:rPr lang="en-US" altLang="en-US" sz="2400"/>
               <a:t>The locations of the components in the simulation are not stored, but instead the relationships between the </a:t>
             </a:r>
             <a:r>
-              <a:rPr lang="" altLang="en-US" sz="2400">
+              <a:rPr lang="en-US" altLang="en-US" sz="2400">
                 <a:latin typeface="Hack" panose="020B0609030202020204" charset="0"/>
                 <a:cs typeface="Hack" panose="020B0609030202020204" charset="0"/>
               </a:rPr>
               <a:t>Block</a:t>
             </a:r>
             <a:r>
-              <a:rPr lang="" altLang="en-US" sz="2400"/>
+              <a:rPr lang="en-US" altLang="en-US" sz="2400"/>
               <a:t>s are stored in an </a:t>
             </a:r>
             <a:r>
-              <a:rPr lang="" altLang="en-US" sz="2400">
+              <a:rPr lang="en-US" altLang="en-US" sz="2400">
                 <a:latin typeface="Hack" panose="020B0609030202020204" charset="0"/>
                 <a:cs typeface="Hack" panose="020B0609030202020204" charset="0"/>
               </a:rPr>
               <a:t>neighbors[] </a:t>
             </a:r>
             <a:r>
-              <a:rPr lang="" altLang="en-US" sz="2400">
+              <a:rPr lang="en-US" altLang="en-US" sz="2400">
                 <a:cs typeface="+mn-lt"/>
               </a:rPr>
               <a:t>array of the neighboring Block id's.</a:t>
             </a:r>
-            <a:endParaRPr lang="" altLang="en-US" sz="2400">
+            <a:endParaRPr lang="en-US" altLang="en-US" sz="2400">
               <a:cs typeface="+mn-lt"/>
             </a:endParaRPr>
           </a:p>
@@ -4168,7 +4168,7 @@
             <a:pPr marL="0" indent="0">
               <a:buNone/>
             </a:pPr>
-            <a:endParaRPr lang="" altLang="en-US" sz="2400">
+            <a:endParaRPr lang="en-US" altLang="en-US" sz="2400">
               <a:cs typeface="+mn-lt"/>
             </a:endParaRPr>
           </a:p>
@@ -4207,10 +4207,10 @@
           <a:bodyPr/>
           <a:p>
             <a:r>
-              <a:rPr lang="" altLang="en-US"/>
+              <a:rPr lang="en-US" altLang="en-US"/>
               <a:t>Autos move:</a:t>
             </a:r>
-            <a:endParaRPr lang="" altLang="en-US"/>
+            <a:endParaRPr lang="en-US" altLang="en-US"/>
           </a:p>
         </p:txBody>
       </p:sp>
@@ -4229,17 +4229,17 @@
           <a:bodyPr/>
           <a:p>
             <a:r>
-              <a:rPr lang="" altLang="en-US"/>
+              <a:rPr lang="en-US" altLang="en-US"/>
               <a:t>I added print statements to every block to show where the auto was moved from and to.</a:t>
             </a:r>
-            <a:endParaRPr lang="" altLang="en-US"/>
-          </a:p>
-          <a:p>
-            <a:r>
-              <a:rPr lang="" altLang="en-US"/>
+            <a:endParaRPr lang="en-US" altLang="en-US"/>
+          </a:p>
+          <a:p>
+            <a:r>
+              <a:rPr lang="en-US" altLang="en-US"/>
               <a:t>the below screenshot shows that the autos move between blocks</a:t>
             </a:r>
-            <a:endParaRPr lang="" altLang="en-US"/>
+            <a:endParaRPr lang="en-US" altLang="en-US"/>
           </a:p>
         </p:txBody>
       </p:sp>
@@ -4300,10 +4300,10 @@
           <a:bodyPr/>
           <a:p>
             <a:r>
-              <a:rPr lang="" altLang="en-US"/>
+              <a:rPr lang="en-US" altLang="en-US"/>
               <a:t>Debugging info for individual blocks </a:t>
             </a:r>
-            <a:endParaRPr lang="" altLang="en-US"/>
+            <a:endParaRPr lang="en-US" altLang="en-US"/>
           </a:p>
         </p:txBody>
       </p:sp>
@@ -4322,17 +4322,17 @@
           <a:bodyPr/>
           <a:p>
             <a:r>
-              <a:rPr lang="" altLang="en-US"/>
+              <a:rPr lang="en-US" altLang="en-US"/>
               <a:t>To make sense of the debugging information mentioned previously, i need the ids of every block</a:t>
             </a:r>
-            <a:endParaRPr lang="" altLang="en-US"/>
-          </a:p>
-          <a:p>
-            <a:r>
-              <a:rPr lang="" altLang="en-US"/>
+            <a:endParaRPr lang="en-US" altLang="en-US"/>
+          </a:p>
+          <a:p>
+            <a:r>
+              <a:rPr lang="en-US" altLang="en-US"/>
               <a:t>the first blocks are defined in a specific order and i can find this, the rest are defined as offsets of an initial value, and thus i had to print these out when debugging</a:t>
             </a:r>
-            <a:endParaRPr lang="" altLang="en-US"/>
+            <a:endParaRPr lang="en-US" altLang="en-US"/>
           </a:p>
         </p:txBody>
       </p:sp>
@@ -4393,10 +4393,10 @@
           <a:bodyPr/>
           <a:p>
             <a:r>
-              <a:rPr lang="" altLang="en-US"/>
+              <a:rPr lang="en-US" altLang="en-US"/>
               <a:t>traffic lights are working</a:t>
             </a:r>
-            <a:endParaRPr lang="" altLang="en-US"/>
+            <a:endParaRPr lang="en-US" altLang="en-US"/>
           </a:p>
         </p:txBody>
       </p:sp>
@@ -4415,10 +4415,10 @@
           <a:bodyPr/>
           <a:p>
             <a:r>
-              <a:rPr lang="" altLang="en-US"/>
+              <a:rPr lang="en-US" altLang="en-US"/>
               <a:t>I added some code to print every time an auto is waiting at a stoplight to make sure they're properly cycling</a:t>
             </a:r>
-            <a:endParaRPr lang="" altLang="en-US"/>
+            <a:endParaRPr lang="en-US" altLang="en-US"/>
           </a:p>
         </p:txBody>
       </p:sp>
@@ -4481,10 +4481,10 @@
           </a:bodyPr>
           <a:p>
             <a:r>
-              <a:rPr lang="" altLang="en-US"/>
+              <a:rPr lang="en-US" altLang="en-US"/>
               <a:t>turning and navigation works correctly</a:t>
             </a:r>
-            <a:endParaRPr lang="" altLang="en-US"/>
+            <a:endParaRPr lang="en-US" altLang="en-US"/>
           </a:p>
         </p:txBody>
       </p:sp>
@@ -4498,55 +4498,60 @@
             <p:ph idx="1"/>
           </p:nvPr>
         </p:nvSpPr>
-        <p:spPr/>
-        <p:txBody>
-          <a:bodyPr/>
-          <a:p>
-            <a:r>
-              <a:rPr lang="" altLang="en-US"/>
+        <p:spPr>
+          <a:xfrm>
+            <a:off x="838200" y="1691005"/>
+            <a:ext cx="10515600" cy="4351338"/>
+          </a:xfrm>
+        </p:spPr>
+        <p:txBody>
+          <a:bodyPr/>
+          <a:p>
+            <a:r>
+              <a:rPr lang="en-US" altLang="en-US"/>
               <a:t>I tested this multiple ways:</a:t>
             </a:r>
-            <a:endParaRPr lang="" altLang="en-US"/>
+            <a:endParaRPr lang="en-US" altLang="en-US"/>
           </a:p>
           <a:p>
             <a:pPr marL="971550" lvl="1" indent="-514350">
               <a:buAutoNum type="arabicPeriod"/>
             </a:pPr>
             <a:r>
-              <a:rPr lang="" altLang="en-US"/>
+              <a:rPr lang="en-US" altLang="en-US"/>
               <a:t>by changing the turning constant (probability of turning left) to one and zero, to verify results are as expected</a:t>
             </a:r>
-            <a:endParaRPr lang="" altLang="en-US"/>
+            <a:endParaRPr lang="en-US" altLang="en-US"/>
           </a:p>
           <a:p>
             <a:pPr lvl="2"/>
             <a:r>
-              <a:rPr lang="" altLang="en-US" sz="2000"/>
+              <a:rPr lang="en-US" altLang="en-US" sz="2000"/>
               <a:t>see screenshot</a:t>
             </a:r>
-            <a:endParaRPr lang="" altLang="en-US"/>
+            <a:endParaRPr lang="en-US" altLang="en-US"/>
           </a:p>
           <a:p>
             <a:pPr marL="971550" lvl="1" indent="-514350">
               <a:buAutoNum type="arabicPeriod"/>
             </a:pPr>
             <a:r>
-              <a:rPr lang="" altLang="en-US"/>
+              <a:rPr lang="en-US" altLang="en-US"/>
               <a:t>by printing out the turn values</a:t>
             </a:r>
-            <a:endParaRPr lang="" altLang="en-US"/>
+            <a:endParaRPr lang="en-US" altLang="en-US"/>
           </a:p>
           <a:p>
             <a:pPr lvl="2"/>
             <a:r>
-              <a:rPr lang="" altLang="en-US"/>
+              <a:rPr lang="en-US" altLang="en-US"/>
               <a:t>works as expected</a:t>
             </a:r>
-            <a:endParaRPr lang="" altLang="en-US"/>
+            <a:endParaRPr lang="en-US" altLang="en-US"/>
           </a:p>
           <a:p>
             <a:pPr lvl="2"/>
-            <a:endParaRPr lang="" altLang="en-US"/>
+            <a:endParaRPr lang="en-US" altLang="en-US"/>
           </a:p>
         </p:txBody>
       </p:sp>
@@ -4620,17 +4625,17 @@
           </a:bodyPr>
           <a:p>
             <a:r>
-              <a:rPr lang="" altLang="en-US"/>
+              <a:rPr lang="en-US" altLang="en-US"/>
               <a:t>- when vehicles always turn left it eventually stops traffic</a:t>
             </a:r>
-            <a:endParaRPr lang="" altLang="en-US"/>
-          </a:p>
-          <a:p>
-            <a:r>
-              <a:rPr lang="" altLang="en-US"/>
+            <a:endParaRPr lang="en-US" altLang="en-US"/>
+          </a:p>
+          <a:p>
+            <a:r>
+              <a:rPr lang="en-US" altLang="en-US"/>
               <a:t>- when vehicles always turn right it produces perfectly even results</a:t>
             </a:r>
-            <a:endParaRPr lang="" altLang="en-US"/>
+            <a:endParaRPr lang="en-US" altLang="en-US"/>
           </a:p>
         </p:txBody>
       </p:sp>
@@ -4667,10 +4672,10 @@
           <a:bodyPr/>
           <a:p>
             <a:r>
-              <a:rPr lang="" altLang="en-US"/>
+              <a:rPr lang="en-US" altLang="en-US"/>
               <a:t>uml of everything</a:t>
             </a:r>
-            <a:endParaRPr lang="" altLang="en-US"/>
+            <a:endParaRPr lang="en-US" altLang="en-US"/>
           </a:p>
         </p:txBody>
       </p:sp>
@@ -4731,30 +4736,58 @@
           <a:bodyPr/>
           <a:p>
             <a:r>
+              <a:rPr lang="en-US" altLang="en-US"/>
+              <a:t>Note on directions</a:t>
+            </a:r>
+            <a:endParaRPr lang="en-US" altLang="en-US"/>
+          </a:p>
+        </p:txBody>
+      </p:sp>
+      <p:sp>
+        <p:nvSpPr>
+          <p:cNvPr id="3" name="Content Placeholder 2"/>
+          <p:cNvSpPr>
+            <a:spLocks noGrp="1"/>
+          </p:cNvSpPr>
+          <p:nvPr>
+            <p:ph idx="1"/>
+          </p:nvPr>
+        </p:nvSpPr>
+        <p:spPr/>
+        <p:txBody>
+          <a:bodyPr/>
+          <a:p>
+            <a:r>
               <a:rPr lang="" altLang="en-US"/>
-              <a:t>Note on directions</a:t>
-            </a:r>
-            <a:endParaRPr lang="" altLang="en-US"/>
-          </a:p>
-        </p:txBody>
-      </p:sp>
-      <p:sp>
-        <p:nvSpPr>
-          <p:cNvPr id="3" name="Content Placeholder 2"/>
-          <p:cNvSpPr>
-            <a:spLocks noGrp="1"/>
-          </p:cNvSpPr>
-          <p:nvPr>
-            <p:ph idx="1"/>
-          </p:nvPr>
-        </p:nvSpPr>
-        <p:spPr/>
-        <p:txBody>
-          <a:bodyPr/>
-          <a:p>
+              <a:t>directions are from compass rose, at times I converted them to fit conventions used in project guide, but i felt that they were confusing so I used things like </a:t>
+            </a:r>
+            <a:r>
+              <a:rPr lang="" altLang="en-US">
+                <a:latin typeface="Hack" panose="020B0609030202020204" charset="0"/>
+                <a:cs typeface="Hack" panose="020B0609030202020204" charset="0"/>
+              </a:rPr>
+              <a:t>Direction.NORTH</a:t>
+            </a:r>
             <a:r>
               <a:rPr lang="" altLang="en-US"/>
-              <a:t>As opposed to using two directions to </a:t>
+              <a:t> instead of </a:t>
+            </a:r>
+            <a:r>
+              <a:rPr lang="" altLang="en-US">
+                <a:latin typeface="Hack" panose="020B0609030202020204" charset="0"/>
+                <a:cs typeface="Hack" panose="020B0609030202020204" charset="0"/>
+              </a:rPr>
+              <a:t>Direction.SN</a:t>
+            </a:r>
+            <a:endParaRPr lang="" altLang="en-US">
+              <a:latin typeface="Hack" panose="020B0609030202020204" charset="0"/>
+              <a:cs typeface="Hack" panose="020B0609030202020204" charset="0"/>
+            </a:endParaRPr>
+          </a:p>
+          <a:p>
+            <a:r>
+              <a:rPr lang="" altLang="en-US"/>
+              <a:t>directional ordinals are in clockwise order, starting from north. (NESW)</a:t>
             </a:r>
             <a:endParaRPr lang="" altLang="en-US"/>
           </a:p>
@@ -4822,10 +4855,10 @@
           <a:bodyPr/>
           <a:p>
             <a:r>
-              <a:rPr lang="" altLang="en-US"/>
+              <a:rPr lang="en-US" altLang="en-US"/>
               <a:t>Blocks UML Overview</a:t>
             </a:r>
-            <a:endParaRPr lang="" altLang="en-US"/>
+            <a:endParaRPr lang="en-US" altLang="en-US"/>
           </a:p>
         </p:txBody>
       </p:sp>
@@ -4862,10 +4895,10 @@
           <a:bodyPr/>
           <a:p>
             <a:r>
-              <a:rPr lang="" altLang="en-US"/>
+              <a:rPr lang="en-US" altLang="en-US"/>
               <a:t>3 types of blocks</a:t>
             </a:r>
-            <a:endParaRPr lang="" altLang="en-US"/>
+            <a:endParaRPr lang="en-US" altLang="en-US"/>
           </a:p>
         </p:txBody>
       </p:sp>
@@ -4884,34 +4917,34 @@
           <a:bodyPr/>
           <a:p>
             <a:r>
-              <a:rPr lang="" altLang="en-US"/>
+              <a:rPr lang="en-US" altLang="en-US"/>
               <a:t>NormalBlock: where cars enter and leave simulation</a:t>
             </a:r>
-            <a:endParaRPr lang="" altLang="en-US"/>
+            <a:endParaRPr lang="en-US" altLang="en-US"/>
           </a:p>
           <a:p>
             <a:pPr lvl="1"/>
             <a:r>
-              <a:rPr lang="" altLang="en-US"/>
+              <a:rPr lang="en-US" altLang="en-US"/>
               <a:t>quantity: 4*span + 4*(span - 1)</a:t>
             </a:r>
-            <a:endParaRPr lang="" altLang="en-US"/>
+            <a:endParaRPr lang="en-US" altLang="en-US"/>
           </a:p>
           <a:p>
             <a:pPr lvl="0"/>
             <a:r>
-              <a:rPr lang="" altLang="en-US"/>
+              <a:rPr lang="en-US" altLang="en-US"/>
               <a:t>TrafficBlock: traffic light, entrance to intersection system</a:t>
             </a:r>
-            <a:endParaRPr lang="" altLang="en-US"/>
+            <a:endParaRPr lang="en-US" altLang="en-US"/>
           </a:p>
           <a:p>
             <a:pPr lvl="1"/>
             <a:r>
-              <a:rPr lang="" altLang="en-US"/>
+              <a:rPr lang="en-US" altLang="en-US"/>
               <a:t>quantity: 4</a:t>
             </a:r>
-            <a:endParaRPr lang="" altLang="en-US"/>
+            <a:endParaRPr lang="en-US" altLang="en-US"/>
           </a:p>
           <a:p>
             <a:pPr lvl="0"/>
@@ -4919,27 +4952,21 @@
               <a:rPr lang="en-US" altLang="en-US">
                 <a:sym typeface="+mn-ea"/>
               </a:rPr>
-              <a:t>IntersectionBlock</a:t>
-            </a:r>
-            <a:r>
-              <a:rPr lang="" altLang="en-US">
-                <a:sym typeface="+mn-ea"/>
-              </a:rPr>
-              <a:t>: where cars can decide to change directions </a:t>
-            </a:r>
-            <a:endParaRPr lang="" altLang="en-US">
+              <a:t>IntersectionBlock: where cars can decide to change directions</a:t>
+            </a:r>
+            <a:endParaRPr lang="en-US" altLang="en-US">
               <a:sym typeface="+mn-ea"/>
             </a:endParaRPr>
           </a:p>
           <a:p>
             <a:pPr lvl="1"/>
             <a:r>
-              <a:rPr lang="" altLang="en-US">
+              <a:rPr lang="en-US" altLang="en-US">
                 <a:sym typeface="+mn-ea"/>
               </a:rPr>
               <a:t>quantity: 4</a:t>
             </a:r>
-            <a:endParaRPr lang="" altLang="en-US">
+            <a:endParaRPr lang="en-US" altLang="en-US">
               <a:sym typeface="+mn-ea"/>
             </a:endParaRPr>
           </a:p>
@@ -4980,10 +5007,10 @@
           </a:bodyPr>
           <a:p>
             <a:r>
-              <a:rPr lang="" altLang="en-US"/>
+              <a:rPr lang="en-US" altLang="en-US"/>
               <a:t>Keypoints of Block abstract superclass</a:t>
             </a:r>
-            <a:endParaRPr lang="" altLang="en-US"/>
+            <a:endParaRPr lang="en-US" altLang="en-US"/>
           </a:p>
         </p:txBody>
       </p:sp>
@@ -5009,87 +5036,87 @@
           </a:bodyPr>
           <a:p>
             <a:r>
-              <a:rPr lang="" altLang="en-US" sz="2400"/>
+              <a:rPr lang="en-US" altLang="en-US" sz="2400"/>
               <a:t>Nested enum for the type of the block is used for debugging</a:t>
             </a:r>
-            <a:endParaRPr lang="" altLang="en-US" sz="2400"/>
-          </a:p>
-          <a:p>
-            <a:r>
-              <a:rPr lang="" altLang="en-US" sz="2400"/>
+            <a:endParaRPr lang="en-US" altLang="en-US" sz="2400"/>
+          </a:p>
+          <a:p>
+            <a:r>
+              <a:rPr lang="en-US" altLang="en-US" sz="2400"/>
               <a:t>because intersect blocks need to have multiple directions, this is left out of the superclass and instead an array is returne by flow(), which could have multiple lengths. </a:t>
             </a:r>
-            <a:endParaRPr lang="" altLang="en-US" sz="2400"/>
-          </a:p>
-          <a:p>
-            <a:r>
-              <a:rPr lang="" altLang="en-US" sz="2400"/>
+            <a:endParaRPr lang="en-US" altLang="en-US" sz="2400"/>
+          </a:p>
+          <a:p>
+            <a:r>
+              <a:rPr lang="en-US" altLang="en-US" sz="2400"/>
               <a:t>key attributes:</a:t>
             </a:r>
-            <a:endParaRPr lang="" altLang="en-US" sz="2400"/>
+            <a:endParaRPr lang="en-US" altLang="en-US" sz="2400"/>
           </a:p>
           <a:p>
             <a:pPr lvl="1"/>
             <a:r>
-              <a:rPr lang="" altLang="en-US" sz="1800"/>
+              <a:rPr lang="en-US" altLang="en-US" sz="1800"/>
               <a:t>id: unique id</a:t>
             </a:r>
-            <a:endParaRPr lang="" altLang="en-US" sz="1800"/>
+            <a:endParaRPr lang="en-US" altLang="en-US" sz="1800"/>
           </a:p>
           <a:p>
             <a:pPr lvl="1"/>
             <a:r>
-              <a:rPr lang="" altLang="en-US" sz="1800"/>
+              <a:rPr lang="en-US" altLang="en-US" sz="1800"/>
               <a:t>autoId: id of the car on the block (zero if there isn't a car)</a:t>
             </a:r>
-            <a:endParaRPr lang="" altLang="en-US" sz="1800"/>
+            <a:endParaRPr lang="en-US" altLang="en-US" sz="1800"/>
           </a:p>
           <a:p>
             <a:pPr lvl="1"/>
             <a:r>
-              <a:rPr lang="" altLang="en-US" sz="1800"/>
+              <a:rPr lang="en-US" altLang="en-US" sz="1800"/>
               <a:t>neighbors[]: id's of the neighboring blocks</a:t>
             </a:r>
-            <a:endParaRPr lang="" altLang="en-US" sz="1800"/>
-          </a:p>
-          <a:p>
-            <a:r>
-              <a:rPr lang="" altLang="en-US" sz="2400"/>
+            <a:endParaRPr lang="en-US" altLang="en-US" sz="1800"/>
+          </a:p>
+          <a:p>
+            <a:r>
+              <a:rPr lang="en-US" altLang="en-US" sz="2400"/>
               <a:t>key methods:</a:t>
             </a:r>
-            <a:endParaRPr lang="" altLang="en-US" sz="2400"/>
+            <a:endParaRPr lang="en-US" altLang="en-US" sz="2400"/>
           </a:p>
           <a:p>
             <a:pPr lvl="1"/>
             <a:r>
-              <a:rPr lang="" altLang="en-US" sz="1800"/>
+              <a:rPr lang="en-US" altLang="en-US" sz="1800"/>
               <a:t>abstract tick() which handles the movement of the auto</a:t>
             </a:r>
-            <a:endParaRPr lang="" altLang="en-US" sz="1800"/>
+            <a:endParaRPr lang="en-US" altLang="en-US" sz="1800"/>
           </a:p>
           <a:p>
             <a:pPr lvl="1"/>
             <a:r>
-              <a:rPr lang="" altLang="en-US" sz="1800"/>
+              <a:rPr lang="en-US" altLang="en-US" sz="1800"/>
               <a:t>vacant() to tell if car is in the current block</a:t>
             </a:r>
-            <a:endParaRPr lang="" altLang="en-US" sz="1800"/>
+            <a:endParaRPr lang="en-US" altLang="en-US" sz="1800"/>
           </a:p>
           <a:p>
             <a:pPr lvl="1"/>
             <a:r>
-              <a:rPr lang="" altLang="en-US" sz="1800"/>
+              <a:rPr lang="en-US" altLang="en-US" sz="1800"/>
               <a:t>relevant accessmodifiers and mutators</a:t>
             </a:r>
-            <a:endParaRPr lang="" altLang="en-US" sz="1800"/>
+            <a:endParaRPr lang="en-US" altLang="en-US" sz="1800"/>
           </a:p>
           <a:p>
             <a:pPr lvl="1"/>
             <a:r>
-              <a:rPr lang="" altLang="en-US" sz="1800"/>
+              <a:rPr lang="en-US" altLang="en-US" sz="1800"/>
               <a:t>toString() gives block type and id</a:t>
             </a:r>
-            <a:endParaRPr lang="" altLang="en-US" sz="2400"/>
+            <a:endParaRPr lang="en-US" altLang="en-US" sz="2400"/>
           </a:p>
         </p:txBody>
       </p:sp>
@@ -5155,10 +5182,10 @@
           <a:bodyPr/>
           <a:p>
             <a:r>
-              <a:rPr lang="" altLang="en-US"/>
+              <a:rPr lang="en-US" altLang="en-US"/>
               <a:t>Keypoints Of NormalBlock subclass</a:t>
             </a:r>
-            <a:endParaRPr lang="" altLang="en-US"/>
+            <a:endParaRPr lang="en-US" altLang="en-US"/>
           </a:p>
         </p:txBody>
       </p:sp>
@@ -5177,58 +5204,58 @@
           <a:bodyPr/>
           <a:p>
             <a:r>
-              <a:rPr lang="" altLang="en-US"/>
+              <a:rPr lang="en-US" altLang="en-US"/>
               <a:t>attribute forward is the Direction of forward for the block</a:t>
             </a:r>
-            <a:endParaRPr lang="" altLang="en-US"/>
-          </a:p>
-          <a:p>
-            <a:r>
-              <a:rPr lang="" altLang="en-US"/>
+            <a:endParaRPr lang="en-US" altLang="en-US"/>
+          </a:p>
+          <a:p>
+            <a:r>
+              <a:rPr lang="en-US" altLang="en-US"/>
               <a:t>tick() method:</a:t>
             </a:r>
-            <a:endParaRPr lang="" altLang="en-US"/>
+            <a:endParaRPr lang="en-US" altLang="en-US"/>
           </a:p>
           <a:p>
             <a:pPr lvl="1"/>
             <a:r>
-              <a:rPr lang="" altLang="en-US"/>
+              <a:rPr lang="en-US" altLang="en-US"/>
               <a:t>no auto? do nothing</a:t>
             </a:r>
-            <a:endParaRPr lang="" altLang="en-US"/>
+            <a:endParaRPr lang="en-US" altLang="en-US"/>
           </a:p>
           <a:p>
             <a:pPr lvl="1"/>
             <a:r>
-              <a:rPr lang="" altLang="en-US"/>
+              <a:rPr lang="en-US" altLang="en-US"/>
               <a:t>if the next block isn't vacant, move the auto to it</a:t>
             </a:r>
-            <a:endParaRPr lang="" altLang="en-US"/>
+            <a:endParaRPr lang="en-US" altLang="en-US"/>
           </a:p>
           <a:p>
             <a:pPr lvl="1"/>
             <a:r>
-              <a:rPr lang="" altLang="en-US"/>
+              <a:rPr lang="en-US" altLang="en-US"/>
               <a:t>if there is no next block, make the car exit the simulation via methods from RoadNetwork</a:t>
             </a:r>
-            <a:endParaRPr lang="" altLang="en-US"/>
+            <a:endParaRPr lang="en-US" altLang="en-US"/>
           </a:p>
           <a:p>
             <a:pPr marL="0" lvl="0" indent="0">
               <a:buNone/>
             </a:pPr>
-            <a:endParaRPr lang="" altLang="en-US" sz="1705"/>
+            <a:endParaRPr lang="en-US" altLang="en-US" sz="1705"/>
           </a:p>
           <a:p>
             <a:pPr lvl="0"/>
-            <a:endParaRPr lang="" altLang="en-US" sz="1705"/>
-          </a:p>
-          <a:p>
-            <a:endParaRPr lang="" altLang="en-US" sz="1710"/>
+            <a:endParaRPr lang="en-US" altLang="en-US" sz="1705"/>
+          </a:p>
+          <a:p>
+            <a:endParaRPr lang="en-US" altLang="en-US" sz="1710"/>
           </a:p>
           <a:p>
             <a:pPr lvl="1"/>
-            <a:endParaRPr lang="" altLang="en-US" sz="1710"/>
+            <a:endParaRPr lang="en-US" altLang="en-US" sz="1710"/>
           </a:p>
         </p:txBody>
       </p:sp>
@@ -5296,10 +5323,10 @@
           </a:bodyPr>
           <a:p>
             <a:r>
-              <a:rPr lang="" altLang="en-US"/>
+              <a:rPr lang="en-US" altLang="en-US"/>
               <a:t>Keypoints of the IntersectionBlock subclass</a:t>
             </a:r>
-            <a:endParaRPr lang="" altLang="en-US"/>
+            <a:endParaRPr lang="en-US" altLang="en-US"/>
           </a:p>
         </p:txBody>
       </p:sp>
@@ -5323,27 +5350,39 @@
           <a:bodyPr/>
           <a:p>
             <a:r>
+              <a:rPr lang="en-US" altLang="en-US" sz="2400"/>
+              <a:t>Direction[] forward holds the two directions the vehicle can go from the intersection block</a:t>
+            </a:r>
+            <a:endParaRPr lang="en-US" altLang="en-US" sz="2400"/>
+          </a:p>
+          <a:p>
+            <a:r>
+              <a:rPr lang="en-US" altLang="en-US" sz="2400"/>
+              <a:t>because the guidelines say left/right turning instead of ordinal directions, i had to make a function which finds the turn direction based on the cars current direction and the directions the intersection supports by converting left and right to clockwise and counterclockwise on  the compass.</a:t>
+            </a:r>
+            <a:endParaRPr lang="en-US" altLang="en-US" sz="2400"/>
+          </a:p>
+          <a:p>
+            <a:r>
+              <a:rPr lang="en-US" altLang="en-US" sz="2400"/>
+              <a:t>the tick method passes a random turn value (where user provided turningRate is likeliness car will turn left)</a:t>
+            </a:r>
+            <a:r>
               <a:rPr lang="" altLang="en-US" sz="2400"/>
-              <a:t>Direction[] forward holds the two directions the vehicle can go from the intersection block</a:t>
+              <a:t>. </a:t>
             </a:r>
             <a:endParaRPr lang="" altLang="en-US" sz="2400"/>
           </a:p>
           <a:p>
-            <a:r>
-              <a:rPr lang="" altLang="en-US" sz="2400"/>
-              <a:t>because the guidelines say left/right turning instead of ordinal directions, i had to make a function which finds the turn direction based on the cars current direction and the directions the intersection supports by converting left and right to clockwise and counterclockwise on  the compass.</a:t>
-            </a:r>
-            <a:endParaRPr lang="" altLang="en-US" sz="2400"/>
-          </a:p>
-          <a:p>
-            <a:r>
-              <a:rPr lang="" altLang="en-US" sz="2400"/>
-              <a:t>the tick method passes a random turn value (where user provided turningRate is likeliness car will turn left)</a:t>
-            </a:r>
-            <a:endParaRPr lang="" altLang="en-US" sz="2400"/>
-          </a:p>
-          <a:p>
-            <a:endParaRPr lang="" altLang="en-US" sz="2400"/>
+            <a:pPr lvl="1"/>
+            <a:r>
+              <a:rPr lang="" altLang="en-US" sz="2055"/>
+              <a:t>Note, somtimes left/right == straight</a:t>
+            </a:r>
+            <a:endParaRPr lang="en-US" altLang="en-US" sz="2055"/>
+          </a:p>
+          <a:p>
+            <a:endParaRPr lang="en-US" altLang="en-US" sz="2400"/>
           </a:p>
         </p:txBody>
       </p:sp>
@@ -5411,7 +5450,7 @@
         </p:blipFill>
         <p:spPr>
           <a:xfrm>
-            <a:off x="4531360" y="4382135"/>
+            <a:off x="4606925" y="4516755"/>
             <a:ext cx="2076450" cy="1438275"/>
           </a:xfrm>
           <a:prstGeom prst="rect">

</xml_diff>